<commit_message>
:speech_balloon: Update udp socket identify condition
</commit_message>
<xml_diff>
--- a/17/yongki/TransportLayer.pptx
+++ b/17/yongki/TransportLayer.pptx
@@ -5878,44 +5878,6 @@
           </p:txBody>
         </p:sp>
       </p:grpSp>
-      <p:pic>
-        <p:nvPicPr>
-          <p:cNvPr id="5" name="오디오 4">
-            <a:hlinkClick r:id="" action="ppaction://media"/>
-            <a:extLst>
-              <a:ext uri="{FF2B5EF4-FFF2-40B4-BE49-F238E27FC236}">
-                <a16:creationId xmlns:a16="http://schemas.microsoft.com/office/drawing/2014/main" id="{2F587EA6-9A86-496E-A745-3808011EE54E}"/>
-              </a:ext>
-            </a:extLst>
-          </p:cNvPr>
-          <p:cNvPicPr>
-            <a:picLocks noChangeAspect="1"/>
-          </p:cNvPicPr>
-          <p:nvPr>
-            <a:audioFile r:link="rId2"/>
-            <p:extLst>
-              <p:ext uri="{DAA4B4D4-6D71-4841-9C94-3DE7FCFB9230}">
-                <p14:media xmlns:p14="http://schemas.microsoft.com/office/powerpoint/2010/main" r:embed="rId1"/>
-              </p:ext>
-            </p:extLst>
-          </p:nvPr>
-        </p:nvPicPr>
-        <p:blipFill>
-          <a:blip r:embed="rId4"/>
-          <a:stretch>
-            <a:fillRect/>
-          </a:stretch>
-        </p:blipFill>
-        <p:spPr>
-          <a:xfrm>
-            <a:off x="8521700" y="6235700"/>
-            <a:ext cx="406400" cy="406400"/>
-          </a:xfrm>
-          <a:prstGeom prst="rect">
-            <a:avLst/>
-          </a:prstGeom>
-        </p:spPr>
-      </p:pic>
     </p:spTree>
   </p:cSld>
   <p:clrMapOvr>
@@ -5929,93 +5891,6 @@
       <p:transition spd="slow" advTm="564"/>
     </mc:Fallback>
   </mc:AlternateContent>
-  <p:timing>
-    <p:tnLst>
-      <p:par>
-        <p:cTn id="1" dur="indefinite" restart="never" nodeType="tmRoot">
-          <p:childTnLst>
-            <p:seq concurrent="1" nextAc="seek">
-              <p:cTn id="2" dur="indefinite" nodeType="mainSeq">
-                <p:childTnLst>
-                  <p:par>
-                    <p:cTn id="3" fill="hold">
-                      <p:stCondLst>
-                        <p:cond delay="indefinite"/>
-                        <p:cond evt="onBegin" delay="0">
-                          <p:tn val="2"/>
-                        </p:cond>
-                      </p:stCondLst>
-                      <p:childTnLst>
-                        <p:par>
-                          <p:cTn id="4" fill="hold">
-                            <p:stCondLst>
-                              <p:cond delay="0"/>
-                            </p:stCondLst>
-                            <p:childTnLst>
-                              <p:par>
-                                <p:cTn id="5" presetID="1" presetClass="mediacall" presetSubtype="0" fill="hold" nodeType="afterEffect">
-                                  <p:stCondLst>
-                                    <p:cond delay="0"/>
-                                  </p:stCondLst>
-                                  <p:childTnLst>
-                                    <p:cmd type="call" cmd="playFrom(0.0)">
-                                      <p:cBhvr>
-                                        <p:cTn id="6" dur="1" fill="hold"/>
-                                        <p:tgtEl>
-                                          <p:spTgt spid="5"/>
-                                        </p:tgtEl>
-                                      </p:cBhvr>
-                                    </p:cmd>
-                                  </p:childTnLst>
-                                </p:cTn>
-                              </p:par>
-                            </p:childTnLst>
-                          </p:cTn>
-                        </p:par>
-                      </p:childTnLst>
-                    </p:cTn>
-                  </p:par>
-                </p:childTnLst>
-              </p:cTn>
-              <p:prevCondLst>
-                <p:cond evt="onPrev" delay="0">
-                  <p:tgtEl>
-                    <p:sldTgt/>
-                  </p:tgtEl>
-                </p:cond>
-              </p:prevCondLst>
-              <p:nextCondLst>
-                <p:cond evt="onNext" delay="0">
-                  <p:tgtEl>
-                    <p:sldTgt/>
-                  </p:tgtEl>
-                </p:cond>
-              </p:nextCondLst>
-            </p:seq>
-            <p:audio isNarration="1">
-              <p:cMediaNode vol="80000" showWhenStopped="0">
-                <p:cTn id="7" fill="hold" display="0">
-                  <p:stCondLst>
-                    <p:cond delay="indefinite"/>
-                  </p:stCondLst>
-                  <p:endCondLst>
-                    <p:cond evt="onStopAudio" delay="0">
-                      <p:tgtEl>
-                        <p:sldTgt/>
-                      </p:tgtEl>
-                    </p:cond>
-                  </p:endCondLst>
-                </p:cTn>
-                <p:tgtEl>
-                  <p:spTgt spid="5"/>
-                </p:tgtEl>
-              </p:cMediaNode>
-            </p:audio>
-          </p:childTnLst>
-        </p:cTn>
-      </p:par>
-    </p:tnLst>
-  </p:timing>
 </p:sld>
 </file>
 
@@ -9477,7 +9352,7 @@
                 <a:latin typeface="맑은 고딕" panose="020B0503020000020004" pitchFamily="50" charset="-127"/>
                 <a:ea typeface="맑은 고딕" panose="020B0503020000020004" pitchFamily="50" charset="-127"/>
               </a:rPr>
-              <a:t>🤔 버퍼라고 알면되는가</a:t>
+              <a:t>🤔 다중화는 버퍼라고 알면되는가</a:t>
             </a:r>
             <a:r>
               <a:rPr lang="en-US" altLang="ko-KR" sz="1400" b="1">
@@ -9980,7 +9855,7 @@
         </p:blipFill>
         <p:spPr>
           <a:xfrm>
-            <a:off x="4272135" y="5311097"/>
+            <a:off x="3742980" y="1812553"/>
             <a:ext cx="4738229" cy="1009791"/>
           </a:xfrm>
           <a:prstGeom prst="rect">
@@ -10004,7 +9879,7 @@
         </p:nvSpPr>
         <p:spPr bwMode="auto">
           <a:xfrm>
-            <a:off x="4283968" y="4867395"/>
+            <a:off x="3754813" y="1368851"/>
             <a:ext cx="1774068" cy="307777"/>
           </a:xfrm>
           <a:prstGeom prst="rect">
@@ -10236,8 +10111,8 @@
         </p:blipFill>
         <p:spPr>
           <a:xfrm>
-            <a:off x="1403648" y="1311715"/>
-            <a:ext cx="5940152" cy="3436883"/>
+            <a:off x="2123728" y="3145003"/>
+            <a:ext cx="4530606" cy="2621341"/>
           </a:xfrm>
           <a:prstGeom prst="rect">
             <a:avLst/>
@@ -10246,10 +10121,10 @@
       </p:pic>
       <p:sp>
         <p:nvSpPr>
-          <p:cNvPr id="7" name="TextBox 28">
+          <p:cNvPr id="10" name="TextBox 28">
             <a:extLst>
               <a:ext uri="{FF2B5EF4-FFF2-40B4-BE49-F238E27FC236}">
-                <a16:creationId xmlns:a16="http://schemas.microsoft.com/office/drawing/2014/main" id="{99E1D10D-9482-4F4D-A18D-7DBF4BB4DEBB}"/>
+                <a16:creationId xmlns:a16="http://schemas.microsoft.com/office/drawing/2014/main" id="{E23E9A4B-C284-478D-BA80-67ABD2D052D3}"/>
               </a:ext>
             </a:extLst>
           </p:cNvPr>
@@ -10258,7 +10133,7 @@
         </p:nvSpPr>
         <p:spPr>
           <a:xfrm rot="19800000">
-            <a:off x="3523913" y="2111639"/>
+            <a:off x="6059205" y="4541895"/>
             <a:ext cx="1520110" cy="475066"/>
           </a:xfrm>
           <a:prstGeom prst="rect">
@@ -10417,7 +10292,7 @@
                 <a:ea typeface="맑은 고딕" panose="020B0503020000020004" pitchFamily="50" charset="-127"/>
                 <a:cs typeface="Arial" panose="020B0604020202020204" pitchFamily="34" charset="0"/>
               </a:rPr>
-              <a:t>UDP</a:t>
+              <a:t>TCP</a:t>
             </a:r>
             <a:r>
               <a:rPr lang="ko-KR" altLang="en-US" b="1" kern="0">
@@ -10428,7 +10303,18 @@
                 <a:ea typeface="맑은 고딕" panose="020B0503020000020004" pitchFamily="50" charset="-127"/>
                 <a:cs typeface="Arial" panose="020B0604020202020204" pitchFamily="34" charset="0"/>
               </a:rPr>
-              <a:t>도 해당</a:t>
+              <a:t>만 해당</a:t>
+            </a:r>
+            <a:r>
+              <a:rPr lang="en-US" altLang="ko-KR" b="1" kern="0">
+                <a:solidFill>
+                  <a:srgbClr val="000000"/>
+                </a:solidFill>
+                <a:latin typeface="맑은 고딕" panose="020B0503020000020004" pitchFamily="50" charset="-127"/>
+                <a:ea typeface="맑은 고딕" panose="020B0503020000020004" pitchFamily="50" charset="-127"/>
+                <a:cs typeface="Arial" panose="020B0604020202020204" pitchFamily="34" charset="0"/>
+              </a:rPr>
+              <a:t>?</a:t>
             </a:r>
             <a:endParaRPr lang="ko-KR" altLang="en-US" b="1" kern="0" dirty="0">
               <a:solidFill>
@@ -10441,232 +10327,6 @@
           </a:p>
         </p:txBody>
       </p:sp>
-      <p:sp>
-        <p:nvSpPr>
-          <p:cNvPr id="10" name="TextBox 28">
-            <a:extLst>
-              <a:ext uri="{FF2B5EF4-FFF2-40B4-BE49-F238E27FC236}">
-                <a16:creationId xmlns:a16="http://schemas.microsoft.com/office/drawing/2014/main" id="{E23E9A4B-C284-478D-BA80-67ABD2D052D3}"/>
-              </a:ext>
-            </a:extLst>
-          </p:cNvPr>
-          <p:cNvSpPr txBox="1"/>
-          <p:nvPr/>
-        </p:nvSpPr>
-        <p:spPr>
-          <a:xfrm rot="19800000">
-            <a:off x="2935743" y="3119263"/>
-            <a:ext cx="1520110" cy="475066"/>
-          </a:xfrm>
-          <a:prstGeom prst="rect">
-            <a:avLst/>
-          </a:prstGeom>
-          <a:noFill/>
-        </p:spPr>
-        <p:txBody>
-          <a:bodyPr wrap="square">
-            <a:spAutoFit/>
-          </a:bodyPr>
-          <a:lstStyle>
-            <a:defPPr>
-              <a:defRPr lang="es-ES"/>
-            </a:defPPr>
-            <a:lvl1pPr algn="l" rtl="0" eaLnBrk="0" fontAlgn="base" hangingPunct="0">
-              <a:spcBef>
-                <a:spcPct val="0"/>
-              </a:spcBef>
-              <a:spcAft>
-                <a:spcPct val="0"/>
-              </a:spcAft>
-              <a:defRPr kern="1200">
-                <a:solidFill>
-                  <a:schemeClr val="tx1"/>
-                </a:solidFill>
-                <a:latin typeface="Arial" panose="020B0604020202020204" pitchFamily="34" charset="0"/>
-                <a:ea typeface="Arial Unicode MS" panose="020B0604020202020204" pitchFamily="50" charset="-127"/>
-                <a:cs typeface="Arial Unicode MS" panose="020B0604020202020204" pitchFamily="50" charset="-127"/>
-              </a:defRPr>
-            </a:lvl1pPr>
-            <a:lvl2pPr marL="457200" algn="l" rtl="0" eaLnBrk="0" fontAlgn="base" hangingPunct="0">
-              <a:spcBef>
-                <a:spcPct val="0"/>
-              </a:spcBef>
-              <a:spcAft>
-                <a:spcPct val="0"/>
-              </a:spcAft>
-              <a:defRPr kern="1200">
-                <a:solidFill>
-                  <a:schemeClr val="tx1"/>
-                </a:solidFill>
-                <a:latin typeface="Arial" panose="020B0604020202020204" pitchFamily="34" charset="0"/>
-                <a:ea typeface="Arial Unicode MS" panose="020B0604020202020204" pitchFamily="50" charset="-127"/>
-                <a:cs typeface="Arial Unicode MS" panose="020B0604020202020204" pitchFamily="50" charset="-127"/>
-              </a:defRPr>
-            </a:lvl2pPr>
-            <a:lvl3pPr marL="914400" algn="l" rtl="0" eaLnBrk="0" fontAlgn="base" hangingPunct="0">
-              <a:spcBef>
-                <a:spcPct val="0"/>
-              </a:spcBef>
-              <a:spcAft>
-                <a:spcPct val="0"/>
-              </a:spcAft>
-              <a:defRPr kern="1200">
-                <a:solidFill>
-                  <a:schemeClr val="tx1"/>
-                </a:solidFill>
-                <a:latin typeface="Arial" panose="020B0604020202020204" pitchFamily="34" charset="0"/>
-                <a:ea typeface="Arial Unicode MS" panose="020B0604020202020204" pitchFamily="50" charset="-127"/>
-                <a:cs typeface="Arial Unicode MS" panose="020B0604020202020204" pitchFamily="50" charset="-127"/>
-              </a:defRPr>
-            </a:lvl3pPr>
-            <a:lvl4pPr marL="1371600" algn="l" rtl="0" eaLnBrk="0" fontAlgn="base" hangingPunct="0">
-              <a:spcBef>
-                <a:spcPct val="0"/>
-              </a:spcBef>
-              <a:spcAft>
-                <a:spcPct val="0"/>
-              </a:spcAft>
-              <a:defRPr kern="1200">
-                <a:solidFill>
-                  <a:schemeClr val="tx1"/>
-                </a:solidFill>
-                <a:latin typeface="Arial" panose="020B0604020202020204" pitchFamily="34" charset="0"/>
-                <a:ea typeface="Arial Unicode MS" panose="020B0604020202020204" pitchFamily="50" charset="-127"/>
-                <a:cs typeface="Arial Unicode MS" panose="020B0604020202020204" pitchFamily="50" charset="-127"/>
-              </a:defRPr>
-            </a:lvl4pPr>
-            <a:lvl5pPr marL="1828800" algn="l" rtl="0" eaLnBrk="0" fontAlgn="base" hangingPunct="0">
-              <a:spcBef>
-                <a:spcPct val="0"/>
-              </a:spcBef>
-              <a:spcAft>
-                <a:spcPct val="0"/>
-              </a:spcAft>
-              <a:defRPr kern="1200">
-                <a:solidFill>
-                  <a:schemeClr val="tx1"/>
-                </a:solidFill>
-                <a:latin typeface="Arial" panose="020B0604020202020204" pitchFamily="34" charset="0"/>
-                <a:ea typeface="Arial Unicode MS" panose="020B0604020202020204" pitchFamily="50" charset="-127"/>
-                <a:cs typeface="Arial Unicode MS" panose="020B0604020202020204" pitchFamily="50" charset="-127"/>
-              </a:defRPr>
-            </a:lvl5pPr>
-            <a:lvl6pPr marL="2286000" algn="l" defTabSz="914400" rtl="0" eaLnBrk="1" latinLnBrk="1" hangingPunct="1">
-              <a:defRPr kern="1200">
-                <a:solidFill>
-                  <a:schemeClr val="tx1"/>
-                </a:solidFill>
-                <a:latin typeface="Arial" panose="020B0604020202020204" pitchFamily="34" charset="0"/>
-                <a:ea typeface="Arial Unicode MS" panose="020B0604020202020204" pitchFamily="50" charset="-127"/>
-                <a:cs typeface="Arial Unicode MS" panose="020B0604020202020204" pitchFamily="50" charset="-127"/>
-              </a:defRPr>
-            </a:lvl6pPr>
-            <a:lvl7pPr marL="2743200" algn="l" defTabSz="914400" rtl="0" eaLnBrk="1" latinLnBrk="1" hangingPunct="1">
-              <a:defRPr kern="1200">
-                <a:solidFill>
-                  <a:schemeClr val="tx1"/>
-                </a:solidFill>
-                <a:latin typeface="Arial" panose="020B0604020202020204" pitchFamily="34" charset="0"/>
-                <a:ea typeface="Arial Unicode MS" panose="020B0604020202020204" pitchFamily="50" charset="-127"/>
-                <a:cs typeface="Arial Unicode MS" panose="020B0604020202020204" pitchFamily="50" charset="-127"/>
-              </a:defRPr>
-            </a:lvl7pPr>
-            <a:lvl8pPr marL="3200400" algn="l" defTabSz="914400" rtl="0" eaLnBrk="1" latinLnBrk="1" hangingPunct="1">
-              <a:defRPr kern="1200">
-                <a:solidFill>
-                  <a:schemeClr val="tx1"/>
-                </a:solidFill>
-                <a:latin typeface="Arial" panose="020B0604020202020204" pitchFamily="34" charset="0"/>
-                <a:ea typeface="Arial Unicode MS" panose="020B0604020202020204" pitchFamily="50" charset="-127"/>
-                <a:cs typeface="Arial Unicode MS" panose="020B0604020202020204" pitchFamily="50" charset="-127"/>
-              </a:defRPr>
-            </a:lvl8pPr>
-            <a:lvl9pPr marL="3657600" algn="l" defTabSz="914400" rtl="0" eaLnBrk="1" latinLnBrk="1" hangingPunct="1">
-              <a:defRPr kern="1200">
-                <a:solidFill>
-                  <a:schemeClr val="tx1"/>
-                </a:solidFill>
-                <a:latin typeface="Arial" panose="020B0604020202020204" pitchFamily="34" charset="0"/>
-                <a:ea typeface="Arial Unicode MS" panose="020B0604020202020204" pitchFamily="50" charset="-127"/>
-                <a:cs typeface="Arial Unicode MS" panose="020B0604020202020204" pitchFamily="50" charset="-127"/>
-              </a:defRPr>
-            </a:lvl9pPr>
-          </a:lstStyle>
-          <a:p>
-            <a:pPr algn="ctr" eaLnBrk="1" latinLnBrk="1" hangingPunct="1">
-              <a:lnSpc>
-                <a:spcPct val="160000"/>
-              </a:lnSpc>
-              <a:spcBef>
-                <a:spcPts val="0"/>
-              </a:spcBef>
-              <a:spcAft>
-                <a:spcPts val="0"/>
-              </a:spcAft>
-              <a:defRPr/>
-            </a:pPr>
-            <a:r>
-              <a:rPr lang="en-US" altLang="ko-KR" b="1" kern="0">
-                <a:solidFill>
-                  <a:srgbClr val="000000"/>
-                </a:solidFill>
-                <a:latin typeface="맑은 고딕" panose="020B0503020000020004" pitchFamily="50" charset="-127"/>
-                <a:ea typeface="맑은 고딕" panose="020B0503020000020004" pitchFamily="50" charset="-127"/>
-                <a:cs typeface="Arial" panose="020B0604020202020204" pitchFamily="34" charset="0"/>
-              </a:rPr>
-              <a:t>TCP</a:t>
-            </a:r>
-            <a:r>
-              <a:rPr lang="ko-KR" altLang="en-US" b="1" kern="0">
-                <a:solidFill>
-                  <a:srgbClr val="000000"/>
-                </a:solidFill>
-                <a:latin typeface="맑은 고딕" panose="020B0503020000020004" pitchFamily="50" charset="-127"/>
-                <a:ea typeface="맑은 고딕" panose="020B0503020000020004" pitchFamily="50" charset="-127"/>
-                <a:cs typeface="Arial" panose="020B0604020202020204" pitchFamily="34" charset="0"/>
-              </a:rPr>
-              <a:t>만 해당</a:t>
-            </a:r>
-            <a:endParaRPr lang="ko-KR" altLang="en-US" b="1" kern="0" dirty="0">
-              <a:solidFill>
-                <a:srgbClr val="000000"/>
-              </a:solidFill>
-              <a:latin typeface="맑은 고딕" panose="020B0503020000020004" pitchFamily="50" charset="-127"/>
-              <a:ea typeface="맑은 고딕" panose="020B0503020000020004" pitchFamily="50" charset="-127"/>
-              <a:cs typeface="Arial" panose="020B0604020202020204" pitchFamily="34" charset="0"/>
-            </a:endParaRPr>
-          </a:p>
-        </p:txBody>
-      </p:sp>
-      <p:pic>
-        <p:nvPicPr>
-          <p:cNvPr id="12" name="그림 11">
-            <a:extLst>
-              <a:ext uri="{FF2B5EF4-FFF2-40B4-BE49-F238E27FC236}">
-                <a16:creationId xmlns:a16="http://schemas.microsoft.com/office/drawing/2014/main" id="{041F1901-5243-44C7-AD25-953AD0AC0AC3}"/>
-              </a:ext>
-            </a:extLst>
-          </p:cNvPr>
-          <p:cNvPicPr>
-            <a:picLocks noChangeAspect="1"/>
-          </p:cNvPicPr>
-          <p:nvPr/>
-        </p:nvPicPr>
-        <p:blipFill rotWithShape="1">
-          <a:blip r:embed="rId2"/>
-          <a:srcRect r="62308" b="36800"/>
-          <a:stretch/>
-        </p:blipFill>
-        <p:spPr>
-          <a:xfrm>
-            <a:off x="90733" y="5311097"/>
-            <a:ext cx="2061054" cy="638183"/>
-          </a:xfrm>
-          <a:prstGeom prst="rect">
-            <a:avLst/>
-          </a:prstGeom>
-        </p:spPr>
-      </p:pic>
       <p:sp>
         <p:nvSpPr>
           <p:cNvPr id="13" name="TextBox 12">
@@ -10683,7 +10343,7 @@
         </p:nvSpPr>
         <p:spPr bwMode="auto">
           <a:xfrm>
-            <a:off x="102564" y="4867395"/>
+            <a:off x="574223" y="1368851"/>
             <a:ext cx="1905205" cy="307777"/>
           </a:xfrm>
           <a:prstGeom prst="rect">
@@ -10894,6 +10554,65 @@
           </a:p>
         </p:txBody>
       </p:sp>
+      <p:pic>
+        <p:nvPicPr>
+          <p:cNvPr id="14" name="그림 13">
+            <a:extLst>
+              <a:ext uri="{FF2B5EF4-FFF2-40B4-BE49-F238E27FC236}">
+                <a16:creationId xmlns:a16="http://schemas.microsoft.com/office/drawing/2014/main" id="{A7D393F8-9078-4B48-AA52-04BE2AE2A593}"/>
+              </a:ext>
+            </a:extLst>
+          </p:cNvPr>
+          <p:cNvPicPr>
+            <a:picLocks noChangeAspect="1"/>
+          </p:cNvPicPr>
+          <p:nvPr/>
+        </p:nvPicPr>
+        <p:blipFill rotWithShape="1">
+          <a:blip r:embed="rId2"/>
+          <a:srcRect r="62288"/>
+          <a:stretch/>
+        </p:blipFill>
+        <p:spPr>
+          <a:xfrm>
+            <a:off x="574223" y="1812552"/>
+            <a:ext cx="2062100" cy="1009791"/>
+          </a:xfrm>
+          <a:prstGeom prst="rect">
+            <a:avLst/>
+          </a:prstGeom>
+        </p:spPr>
+      </p:pic>
+      <p:pic>
+        <p:nvPicPr>
+          <p:cNvPr id="4" name="그림 3">
+            <a:extLst>
+              <a:ext uri="{FF2B5EF4-FFF2-40B4-BE49-F238E27FC236}">
+                <a16:creationId xmlns:a16="http://schemas.microsoft.com/office/drawing/2014/main" id="{A9C5FB82-1758-456B-B69B-EC1536270F42}"/>
+              </a:ext>
+            </a:extLst>
+          </p:cNvPr>
+          <p:cNvPicPr>
+            <a:picLocks noChangeAspect="1"/>
+          </p:cNvPicPr>
+          <p:nvPr/>
+        </p:nvPicPr>
+        <p:blipFill>
+          <a:blip r:embed="rId4"/>
+          <a:stretch>
+            <a:fillRect/>
+          </a:stretch>
+        </p:blipFill>
+        <p:spPr>
+          <a:xfrm>
+            <a:off x="680494" y="5981896"/>
+            <a:ext cx="7783011" cy="571580"/>
+          </a:xfrm>
+          <a:prstGeom prst="rect">
+            <a:avLst/>
+          </a:prstGeom>
+        </p:spPr>
+      </p:pic>
     </p:spTree>
     <p:extLst>
       <p:ext uri="{BB962C8B-B14F-4D97-AF65-F5344CB8AC3E}">

</xml_diff>